<commit_message>
demo cierre presentacion calidad
</commit_message>
<xml_diff>
--- a/2-calidad/4-capacitaciones/Capacitaciones/CTO - Capacitacion Sistema de Tickets (Apertura Espacios).pptx
+++ b/2-calidad/4-capacitaciones/Capacitaciones/CTO - Capacitacion Sistema de Tickets (Apertura Espacios).pptx
@@ -583,7 +583,7 @@
           <a:p>
             <a:fld id="{B4EF350F-E890-4EE9-9AB1-5E1DE57FD185}" type="datetimeFigureOut">
               <a:rPr lang="es-ES" smtClean="0"/>
-              <a:t>02/05/2016</a:t>
+              <a:t>03/05/2016</a:t>
             </a:fld>
             <a:endParaRPr lang="es-ES"/>
           </a:p>
@@ -748,7 +748,7 @@
           <a:p>
             <a:fld id="{B4EF350F-E890-4EE9-9AB1-5E1DE57FD185}" type="datetimeFigureOut">
               <a:rPr lang="es-ES" smtClean="0"/>
-              <a:t>02/05/2016</a:t>
+              <a:t>03/05/2016</a:t>
             </a:fld>
             <a:endParaRPr lang="es-ES"/>
           </a:p>
@@ -923,7 +923,7 @@
           <a:p>
             <a:fld id="{B4EF350F-E890-4EE9-9AB1-5E1DE57FD185}" type="datetimeFigureOut">
               <a:rPr lang="es-ES" smtClean="0"/>
-              <a:t>02/05/2016</a:t>
+              <a:t>03/05/2016</a:t>
             </a:fld>
             <a:endParaRPr lang="es-ES"/>
           </a:p>
@@ -1088,7 +1088,7 @@
           <a:p>
             <a:fld id="{B4EF350F-E890-4EE9-9AB1-5E1DE57FD185}" type="datetimeFigureOut">
               <a:rPr lang="es-ES" smtClean="0"/>
-              <a:t>02/05/2016</a:t>
+              <a:t>03/05/2016</a:t>
             </a:fld>
             <a:endParaRPr lang="es-ES"/>
           </a:p>
@@ -1641,7 +1641,7 @@
           <a:p>
             <a:fld id="{B4EF350F-E890-4EE9-9AB1-5E1DE57FD185}" type="datetimeFigureOut">
               <a:rPr lang="es-ES" smtClean="0"/>
-              <a:t>02/05/2016</a:t>
+              <a:t>03/05/2016</a:t>
             </a:fld>
             <a:endParaRPr lang="es-ES"/>
           </a:p>
@@ -1901,7 +1901,7 @@
           <a:p>
             <a:fld id="{B4EF350F-E890-4EE9-9AB1-5E1DE57FD185}" type="datetimeFigureOut">
               <a:rPr lang="es-ES" smtClean="0"/>
-              <a:t>02/05/2016</a:t>
+              <a:t>03/05/2016</a:t>
             </a:fld>
             <a:endParaRPr lang="es-ES"/>
           </a:p>
@@ -2389,7 +2389,7 @@
           <a:p>
             <a:fld id="{B4EF350F-E890-4EE9-9AB1-5E1DE57FD185}" type="datetimeFigureOut">
               <a:rPr lang="es-ES" smtClean="0"/>
-              <a:t>02/05/2016</a:t>
+              <a:t>03/05/2016</a:t>
             </a:fld>
             <a:endParaRPr lang="es-ES"/>
           </a:p>
@@ -2502,7 +2502,7 @@
           <a:p>
             <a:fld id="{B4EF350F-E890-4EE9-9AB1-5E1DE57FD185}" type="datetimeFigureOut">
               <a:rPr lang="es-ES" smtClean="0"/>
-              <a:t>02/05/2016</a:t>
+              <a:t>03/05/2016</a:t>
             </a:fld>
             <a:endParaRPr lang="es-ES"/>
           </a:p>
@@ -2592,7 +2592,7 @@
           <a:p>
             <a:fld id="{B4EF350F-E890-4EE9-9AB1-5E1DE57FD185}" type="datetimeFigureOut">
               <a:rPr lang="es-ES" smtClean="0"/>
-              <a:t>02/05/2016</a:t>
+              <a:t>03/05/2016</a:t>
             </a:fld>
             <a:endParaRPr lang="es-ES"/>
           </a:p>
@@ -3022,7 +3022,7 @@
           <a:p>
             <a:fld id="{B4EF350F-E890-4EE9-9AB1-5E1DE57FD185}" type="datetimeFigureOut">
               <a:rPr lang="es-ES" smtClean="0"/>
-              <a:t>02/05/2016</a:t>
+              <a:t>03/05/2016</a:t>
             </a:fld>
             <a:endParaRPr lang="es-ES"/>
           </a:p>
@@ -3555,7 +3555,7 @@
           <a:p>
             <a:fld id="{B4EF350F-E890-4EE9-9AB1-5E1DE57FD185}" type="datetimeFigureOut">
               <a:rPr lang="es-ES" smtClean="0"/>
-              <a:t>02/05/2016</a:t>
+              <a:t>03/05/2016</a:t>
             </a:fld>
             <a:endParaRPr lang="es-ES"/>
           </a:p>
@@ -4395,7 +4395,7 @@
           <a:p>
             <a:fld id="{B4EF350F-E890-4EE9-9AB1-5E1DE57FD185}" type="datetimeFigureOut">
               <a:rPr lang="es-ES" smtClean="0"/>
-              <a:t>02/05/2016</a:t>
+              <a:t>03/05/2016</a:t>
             </a:fld>
             <a:endParaRPr lang="es-ES"/>
           </a:p>
@@ -5585,7 +5585,7 @@
         <p:spPr/>
         <p:txBody>
           <a:bodyPr>
-            <a:normAutofit lnSpcReduction="10000"/>
+            <a:normAutofit/>
           </a:bodyPr>
           <a:lstStyle/>
           <a:p>
@@ -5636,6 +5636,13 @@
               <a:rPr lang="es-ES" sz="1800" b="0" dirty="0" smtClean="0"/>
               <a:t>.</a:t>
             </a:r>
+          </a:p>
+          <a:p>
+            <a:pPr>
+              <a:buFont typeface="Wingdings" panose="05000000000000000000" pitchFamily="2" charset="2"/>
+              <a:buChar char="Ø"/>
+            </a:pPr>
+            <a:endParaRPr lang="es-ES" sz="1800" b="0" dirty="0" smtClean="0"/>
           </a:p>
           <a:p>
             <a:pPr>
@@ -5643,20 +5650,6 @@
               <a:buChar char="Ø"/>
             </a:pPr>
             <a:endParaRPr lang="es-ES" sz="1800" b="0" dirty="0"/>
-          </a:p>
-          <a:p>
-            <a:pPr marL="0" indent="0"/>
-            <a:r>
-              <a:rPr lang="es-ES" sz="1800" dirty="0" smtClean="0">
-                <a:latin typeface="Gisha" panose="020B0502040204020203" pitchFamily="34" charset="-79"/>
-                <a:cs typeface="Gisha" panose="020B0502040204020203" pitchFamily="34" charset="-79"/>
-              </a:rPr>
-              <a:t>¡ VEAMOS LA DEMO !</a:t>
-            </a:r>
-            <a:endParaRPr lang="es-ES" sz="1800" dirty="0">
-              <a:latin typeface="Gisha" panose="020B0502040204020203" pitchFamily="34" charset="-79"/>
-              <a:cs typeface="Gisha" panose="020B0502040204020203" pitchFamily="34" charset="-79"/>
-            </a:endParaRPr>
           </a:p>
         </p:txBody>
       </p:sp>
@@ -6090,6 +6083,37 @@
           <a:bodyPr/>
           <a:lstStyle/>
           <a:p>
+            <a:endParaRPr lang="es-AR" dirty="0" smtClean="0"/>
+          </a:p>
+          <a:p>
+            <a:endParaRPr lang="es-ES" dirty="0" smtClean="0"/>
+          </a:p>
+          <a:p>
+            <a:r>
+              <a:rPr lang="es-ES" dirty="0" smtClean="0"/>
+              <a:t>PROCEDIMIENTO </a:t>
+            </a:r>
+            <a:r>
+              <a:rPr lang="es-ES" dirty="0"/>
+              <a:t>ESPECIAL DE APERTURA Y CIERRE DE ESPACIOS</a:t>
+            </a:r>
+          </a:p>
+          <a:p>
+            <a:endParaRPr lang="es-AR" dirty="0"/>
+          </a:p>
+          <a:p>
+            <a:r>
+              <a:rPr lang="es-AR" dirty="0" smtClean="0"/>
+              <a:t>Objetivo</a:t>
+            </a:r>
+            <a:r>
+              <a:rPr lang="es-AR" dirty="0"/>
+              <a:t>: </a:t>
+            </a:r>
+            <a:r>
+              <a:rPr lang="es-AR" i="1" dirty="0"/>
+              <a:t>Normalizar la mecánica, los roles y las responsabilidades en la gestión de Cierre y apertura de los Espacios mediante el uso de Tickets</a:t>
+            </a:r>
             <a:endParaRPr lang="es-ES" dirty="0"/>
           </a:p>
         </p:txBody>
@@ -6140,7 +6164,7 @@
           <p:nvPr/>
         </p:nvPicPr>
         <p:blipFill>
-          <a:blip r:embed="rId2">
+          <a:blip r:embed="rId3">
             <a:extLst>
               <a:ext uri="{28A0092B-C50C-407E-A947-70E740481C1C}">
                 <a14:useLocalDpi xmlns:a14="http://schemas.microsoft.com/office/drawing/2010/main" val="0"/>
@@ -6293,25 +6317,63 @@
           </a:p>
         </p:txBody>
       </p:sp>
-      <p:sp>
-        <p:nvSpPr>
-          <p:cNvPr id="2" name="1 Marcador de contenido"/>
-          <p:cNvSpPr>
-            <a:spLocks noGrp="1"/>
-          </p:cNvSpPr>
+      <p:graphicFrame>
+        <p:nvGraphicFramePr>
+          <p:cNvPr id="3" name="2 Objeto"/>
+          <p:cNvGraphicFramePr>
+            <a:graphicFrameLocks noChangeAspect="1"/>
+          </p:cNvGraphicFramePr>
           <p:nvPr>
-            <p:ph idx="1"/>
+            <p:extLst>
+              <p:ext uri="{D42A27DB-BD31-4B8C-83A1-F6EECF244321}">
+                <p14:modId xmlns:p14="http://schemas.microsoft.com/office/powerpoint/2010/main" val="2067497812"/>
+              </p:ext>
+            </p:extLst>
           </p:nvPr>
-        </p:nvSpPr>
-        <p:spPr/>
-        <p:txBody>
-          <a:bodyPr/>
-          <a:lstStyle/>
-          <a:p>
-            <a:endParaRPr lang="es-ES"/>
-          </a:p>
-        </p:txBody>
-      </p:sp>
+        </p:nvGraphicFramePr>
+        <p:xfrm>
+          <a:off x="619944" y="1215898"/>
+          <a:ext cx="7963732" cy="5181024"/>
+        </p:xfrm>
+        <a:graphic>
+          <a:graphicData uri="http://schemas.openxmlformats.org/presentationml/2006/ole">
+            <mc:AlternateContent xmlns:mc="http://schemas.openxmlformats.org/markup-compatibility/2006">
+              <mc:Choice xmlns:v="urn:schemas-microsoft-com:vml" Requires="v">
+                <p:oleObj spid="_x0000_s2050" name="Documento" r:id="rId4" imgW="8386681" imgH="5455763" progId="Word.Document.12">
+                  <p:embed/>
+                </p:oleObj>
+              </mc:Choice>
+              <mc:Fallback>
+                <p:oleObj name="Documento" r:id="rId4" imgW="8386681" imgH="5455763" progId="Word.Document.12">
+                  <p:embed/>
+                  <p:pic>
+                    <p:nvPicPr>
+                      <p:cNvPr id="0" name=""/>
+                      <p:cNvPicPr/>
+                      <p:nvPr/>
+                    </p:nvPicPr>
+                    <p:blipFill>
+                      <a:blip r:embed="rId5"/>
+                      <a:stretch>
+                        <a:fillRect/>
+                      </a:stretch>
+                    </p:blipFill>
+                    <p:spPr>
+                      <a:xfrm>
+                        <a:off x="619944" y="1215898"/>
+                        <a:ext cx="7963732" cy="5181024"/>
+                      </a:xfrm>
+                      <a:prstGeom prst="rect">
+                        <a:avLst/>
+                      </a:prstGeom>
+                    </p:spPr>
+                  </p:pic>
+                </p:oleObj>
+              </mc:Fallback>
+            </mc:AlternateContent>
+          </a:graphicData>
+        </a:graphic>
+      </p:graphicFrame>
     </p:spTree>
     <p:extLst>
       <p:ext uri="{BB962C8B-B14F-4D97-AF65-F5344CB8AC3E}">
@@ -6481,6 +6543,95 @@
           </a:p>
         </p:txBody>
       </p:sp>
+      <p:sp>
+        <p:nvSpPr>
+          <p:cNvPr id="2" name="1 Rectángulo"/>
+          <p:cNvSpPr/>
+          <p:nvPr/>
+        </p:nvSpPr>
+        <p:spPr>
+          <a:xfrm>
+            <a:off x="2555777" y="2852936"/>
+            <a:ext cx="4094646" cy="461665"/>
+          </a:xfrm>
+          <a:prstGeom prst="rect">
+            <a:avLst/>
+          </a:prstGeom>
+        </p:spPr>
+        <p:txBody>
+          <a:bodyPr wrap="square">
+            <a:spAutoFit/>
+          </a:bodyPr>
+          <a:lstStyle/>
+          <a:p>
+            <a:r>
+              <a:rPr lang="es-ES" sz="2400" b="1" dirty="0">
+                <a:latin typeface="Gisha" panose="020B0502040204020203" pitchFamily="34" charset="-79"/>
+                <a:cs typeface="Gisha" panose="020B0502040204020203" pitchFamily="34" charset="-79"/>
+              </a:rPr>
+              <a:t>¡ VEAMOS LA DEMO !</a:t>
+            </a:r>
+            <a:endParaRPr lang="es-ES" sz="2400" b="1" dirty="0">
+              <a:latin typeface="Gisha" panose="020B0502040204020203" pitchFamily="34" charset="-79"/>
+              <a:cs typeface="Gisha" panose="020B0502040204020203" pitchFamily="34" charset="-79"/>
+            </a:endParaRPr>
+          </a:p>
+        </p:txBody>
+      </p:sp>
+      <p:pic>
+        <p:nvPicPr>
+          <p:cNvPr id="1026" name="Picture 2"/>
+          <p:cNvPicPr>
+            <a:picLocks noChangeAspect="1" noChangeArrowheads="1"/>
+          </p:cNvPicPr>
+          <p:nvPr/>
+        </p:nvPicPr>
+        <p:blipFill>
+          <a:blip r:embed="rId3">
+            <a:extLst>
+              <a:ext uri="{28A0092B-C50C-407E-A947-70E740481C1C}">
+                <a14:useLocalDpi xmlns:a14="http://schemas.microsoft.com/office/drawing/2010/main" val="0"/>
+              </a:ext>
+            </a:extLst>
+          </a:blip>
+          <a:srcRect/>
+          <a:stretch>
+            <a:fillRect/>
+          </a:stretch>
+        </p:blipFill>
+        <p:spPr bwMode="auto">
+          <a:xfrm>
+            <a:off x="5724128" y="2582019"/>
+            <a:ext cx="2143125" cy="2143125"/>
+          </a:xfrm>
+          <a:prstGeom prst="rect">
+            <a:avLst/>
+          </a:prstGeom>
+          <a:noFill/>
+          <a:ln>
+            <a:noFill/>
+          </a:ln>
+          <a:extLst>
+            <a:ext uri="{909E8E84-426E-40DD-AFC4-6F175D3DCCD1}">
+              <a14:hiddenFill xmlns:a14="http://schemas.microsoft.com/office/drawing/2010/main">
+                <a:solidFill>
+                  <a:schemeClr val="accent1"/>
+                </a:solidFill>
+              </a14:hiddenFill>
+            </a:ext>
+            <a:ext uri="{91240B29-F687-4F45-9708-019B960494DF}">
+              <a14:hiddenLine xmlns:a14="http://schemas.microsoft.com/office/drawing/2010/main" w="9525">
+                <a:solidFill>
+                  <a:schemeClr val="tx1"/>
+                </a:solidFill>
+                <a:miter lim="800000"/>
+                <a:headEnd/>
+                <a:tailEnd/>
+              </a14:hiddenLine>
+            </a:ext>
+          </a:extLst>
+        </p:spPr>
+      </p:pic>
     </p:spTree>
     <p:extLst>
       <p:ext uri="{BB962C8B-B14F-4D97-AF65-F5344CB8AC3E}">

</xml_diff>